<commit_message>
Added au5_E_siliculosus to metabolite heatmaps and PCoAs
</commit_message>
<xml_diff>
--- a/supplementary_material/aureme_pcoas.pptx
+++ b/supplementary_material/aureme_pcoas.pptx
@@ -5,7 +5,7 @@
     <p:sldMasterId id="2147483768" r:id="rId1"/>
   </p:sldMasterIdLst>
   <p:sldIdLst>
-    <p:sldId id="256" r:id="rId2"/>
+    <p:sldId id="257" r:id="rId2"/>
   </p:sldIdLst>
   <p:sldSz cx="11879263" cy="5400675"/>
   <p:notesSz cx="6858000" cy="9144000"/>
@@ -243,7 +243,7 @@
           <a:p>
             <a:fld id="{476D9124-AB36-4B7F-A4E2-3FFA9B99052F}" type="datetimeFigureOut">
               <a:rPr lang="en-US" smtClean="0"/>
-              <a:t>6/16/25</a:t>
+              <a:t>7/1/2025</a:t>
             </a:fld>
             <a:endParaRPr lang="en-US"/>
           </a:p>
@@ -413,7 +413,7 @@
           <a:p>
             <a:fld id="{476D9124-AB36-4B7F-A4E2-3FFA9B99052F}" type="datetimeFigureOut">
               <a:rPr lang="en-US" smtClean="0"/>
-              <a:t>6/16/25</a:t>
+              <a:t>7/1/2025</a:t>
             </a:fld>
             <a:endParaRPr lang="en-US"/>
           </a:p>
@@ -593,7 +593,7 @@
           <a:p>
             <a:fld id="{476D9124-AB36-4B7F-A4E2-3FFA9B99052F}" type="datetimeFigureOut">
               <a:rPr lang="en-US" smtClean="0"/>
-              <a:t>6/16/25</a:t>
+              <a:t>7/1/2025</a:t>
             </a:fld>
             <a:endParaRPr lang="en-US"/>
           </a:p>
@@ -763,7 +763,7 @@
           <a:p>
             <a:fld id="{476D9124-AB36-4B7F-A4E2-3FFA9B99052F}" type="datetimeFigureOut">
               <a:rPr lang="en-US" smtClean="0"/>
-              <a:t>6/16/25</a:t>
+              <a:t>7/1/2025</a:t>
             </a:fld>
             <a:endParaRPr lang="en-US"/>
           </a:p>
@@ -1009,7 +1009,7 @@
           <a:p>
             <a:fld id="{476D9124-AB36-4B7F-A4E2-3FFA9B99052F}" type="datetimeFigureOut">
               <a:rPr lang="en-US" smtClean="0"/>
-              <a:t>6/16/25</a:t>
+              <a:t>7/1/2025</a:t>
             </a:fld>
             <a:endParaRPr lang="en-US"/>
           </a:p>
@@ -1241,7 +1241,7 @@
           <a:p>
             <a:fld id="{476D9124-AB36-4B7F-A4E2-3FFA9B99052F}" type="datetimeFigureOut">
               <a:rPr lang="en-US" smtClean="0"/>
-              <a:t>6/16/25</a:t>
+              <a:t>7/1/2025</a:t>
             </a:fld>
             <a:endParaRPr lang="en-US"/>
           </a:p>
@@ -1608,7 +1608,7 @@
           <a:p>
             <a:fld id="{476D9124-AB36-4B7F-A4E2-3FFA9B99052F}" type="datetimeFigureOut">
               <a:rPr lang="en-US" smtClean="0"/>
-              <a:t>6/16/25</a:t>
+              <a:t>7/1/2025</a:t>
             </a:fld>
             <a:endParaRPr lang="en-US"/>
           </a:p>
@@ -1726,7 +1726,7 @@
           <a:p>
             <a:fld id="{476D9124-AB36-4B7F-A4E2-3FFA9B99052F}" type="datetimeFigureOut">
               <a:rPr lang="en-US" smtClean="0"/>
-              <a:t>6/16/25</a:t>
+              <a:t>7/1/2025</a:t>
             </a:fld>
             <a:endParaRPr lang="en-US"/>
           </a:p>
@@ -1821,7 +1821,7 @@
           <a:p>
             <a:fld id="{476D9124-AB36-4B7F-A4E2-3FFA9B99052F}" type="datetimeFigureOut">
               <a:rPr lang="en-US" smtClean="0"/>
-              <a:t>6/16/25</a:t>
+              <a:t>7/1/2025</a:t>
             </a:fld>
             <a:endParaRPr lang="en-US"/>
           </a:p>
@@ -2098,7 +2098,7 @@
           <a:p>
             <a:fld id="{476D9124-AB36-4B7F-A4E2-3FFA9B99052F}" type="datetimeFigureOut">
               <a:rPr lang="en-US" smtClean="0"/>
-              <a:t>6/16/25</a:t>
+              <a:t>7/1/2025</a:t>
             </a:fld>
             <a:endParaRPr lang="en-US"/>
           </a:p>
@@ -2355,7 +2355,7 @@
           <a:p>
             <a:fld id="{476D9124-AB36-4B7F-A4E2-3FFA9B99052F}" type="datetimeFigureOut">
               <a:rPr lang="en-US" smtClean="0"/>
-              <a:t>6/16/25</a:t>
+              <a:t>7/1/2025</a:t>
             </a:fld>
             <a:endParaRPr lang="en-US"/>
           </a:p>
@@ -2568,7 +2568,7 @@
           <a:p>
             <a:fld id="{476D9124-AB36-4B7F-A4E2-3FFA9B99052F}" type="datetimeFigureOut">
               <a:rPr lang="en-US" smtClean="0"/>
-              <a:t>6/16/25</a:t>
+              <a:t>7/1/2025</a:t>
             </a:fld>
             <a:endParaRPr lang="en-US"/>
           </a:p>
@@ -2961,7 +2961,13 @@
   <p:cSld>
     <p:spTree>
       <p:nvGrpSpPr>
-        <p:cNvPr id="1" name=""/>
+        <p:cNvPr id="1" name="">
+          <a:extLst>
+            <a:ext uri="{FF2B5EF4-FFF2-40B4-BE49-F238E27FC236}">
+              <a16:creationId xmlns:a16="http://schemas.microsoft.com/office/drawing/2014/main" id="{27F93A30-7FA2-CB8D-6EC0-E9D1AF613B40}"/>
+            </a:ext>
+          </a:extLst>
+        </p:cNvPr>
         <p:cNvGrpSpPr/>
         <p:nvPr/>
       </p:nvGrpSpPr>
@@ -2975,10 +2981,10 @@
       </p:grpSpPr>
       <p:pic>
         <p:nvPicPr>
-          <p:cNvPr id="144" name="Picture 143" descr="A graph with colored squares&#10;&#10;Description automatically generated with medium confidence">
+          <p:cNvPr id="3" name="Picture 2" descr="A chart with different colored dots&#10;&#10;AI-generated content may be incorrect.">
             <a:extLst>
               <a:ext uri="{FF2B5EF4-FFF2-40B4-BE49-F238E27FC236}">
-                <a16:creationId xmlns:a16="http://schemas.microsoft.com/office/drawing/2014/main" id="{4450E266-8937-10C3-F1B0-EBFAF709B4F4}"/>
+                <a16:creationId xmlns:a16="http://schemas.microsoft.com/office/drawing/2014/main" id="{BC2E01DF-EEB5-ADF6-830E-FCA9F2636B7C}"/>
               </a:ext>
             </a:extLst>
           </p:cNvPr>
@@ -2995,13 +3001,15 @@
               </a:ext>
             </a:extLst>
           </a:blip>
-          <a:srcRect r="29550"/>
-          <a:stretch/>
+          <a:srcRect r="31657"/>
+          <a:stretch>
+            <a:fillRect/>
+          </a:stretch>
         </p:blipFill>
         <p:spPr>
           <a:xfrm>
-            <a:off x="80573" y="4476"/>
-            <a:ext cx="4767304" cy="5413497"/>
+            <a:off x="193778" y="150783"/>
+            <a:ext cx="4472636" cy="5235475"/>
           </a:xfrm>
           <a:prstGeom prst="rect">
             <a:avLst/>
@@ -3013,7 +3021,7 @@
           <p:cNvPr id="167" name="TextBox 166">
             <a:extLst>
               <a:ext uri="{FF2B5EF4-FFF2-40B4-BE49-F238E27FC236}">
-                <a16:creationId xmlns:a16="http://schemas.microsoft.com/office/drawing/2014/main" id="{06ACBB14-4B44-2383-3E82-8475DCF04DB8}"/>
+                <a16:creationId xmlns:a16="http://schemas.microsoft.com/office/drawing/2014/main" id="{9C13846D-EE02-E500-0245-7F7F569E6DA1}"/>
               </a:ext>
             </a:extLst>
           </p:cNvPr>
@@ -3046,50 +3054,12 @@
           </a:p>
         </p:txBody>
       </p:sp>
-      <p:sp>
-        <p:nvSpPr>
-          <p:cNvPr id="168" name="TextBox 167">
+      <p:pic>
+        <p:nvPicPr>
+          <p:cNvPr id="5" name="Picture 4" descr="A screen shot of a graph&#10;&#10;AI-generated content may be incorrect.">
             <a:extLst>
               <a:ext uri="{FF2B5EF4-FFF2-40B4-BE49-F238E27FC236}">
-                <a16:creationId xmlns:a16="http://schemas.microsoft.com/office/drawing/2014/main" id="{E1F9216E-757C-A421-33D7-414ECE38891C}"/>
-              </a:ext>
-            </a:extLst>
-          </p:cNvPr>
-          <p:cNvSpPr txBox="1"/>
-          <p:nvPr/>
-        </p:nvSpPr>
-        <p:spPr>
-          <a:xfrm>
-            <a:off x="4718484" y="64270"/>
-            <a:ext cx="412292" cy="307777"/>
-          </a:xfrm>
-          <a:prstGeom prst="rect">
-            <a:avLst/>
-          </a:prstGeom>
-          <a:noFill/>
-        </p:spPr>
-        <p:txBody>
-          <a:bodyPr wrap="none" rtlCol="0">
-            <a:spAutoFit/>
-          </a:bodyPr>
-          <a:lstStyle/>
-          <a:p>
-            <a:r>
-              <a:rPr lang="en-US" sz="1400" dirty="0">
-                <a:latin typeface="Arial" panose="020B0604020202020204" pitchFamily="34" charset="0"/>
-                <a:cs typeface="Arial" panose="020B0604020202020204" pitchFamily="34" charset="0"/>
-              </a:rPr>
-              <a:t>(b)</a:t>
-            </a:r>
-          </a:p>
-        </p:txBody>
-      </p:sp>
-      <p:pic>
-        <p:nvPicPr>
-          <p:cNvPr id="171" name="Picture 170" descr="A chart with different colored squares&#10;&#10;Description automatically generated">
-            <a:extLst>
-              <a:ext uri="{FF2B5EF4-FFF2-40B4-BE49-F238E27FC236}">
-                <a16:creationId xmlns:a16="http://schemas.microsoft.com/office/drawing/2014/main" id="{250DDC2B-E226-A5FD-61FF-D1258E8425A1}"/>
+                <a16:creationId xmlns:a16="http://schemas.microsoft.com/office/drawing/2014/main" id="{B72F7713-A10A-AA86-997F-B1E91BD0CB12}"/>
               </a:ext>
             </a:extLst>
           </p:cNvPr>
@@ -3106,58 +3076,62 @@
               </a:ext>
             </a:extLst>
           </a:blip>
-          <a:srcRect r="31133"/>
-          <a:stretch/>
+          <a:stretch>
+            <a:fillRect/>
+          </a:stretch>
         </p:blipFill>
         <p:spPr>
           <a:xfrm>
-            <a:off x="5242856" y="0"/>
-            <a:ext cx="4663996" cy="5417973"/>
+            <a:off x="5048785" y="150783"/>
+            <a:ext cx="6544344" cy="5235475"/>
           </a:xfrm>
           <a:prstGeom prst="rect">
             <a:avLst/>
           </a:prstGeom>
         </p:spPr>
       </p:pic>
-      <p:pic>
-        <p:nvPicPr>
-          <p:cNvPr id="172" name="Picture 171" descr="A graph with colored squares&#10;&#10;Description automatically generated with medium confidence">
+      <p:sp>
+        <p:nvSpPr>
+          <p:cNvPr id="168" name="TextBox 167">
             <a:extLst>
               <a:ext uri="{FF2B5EF4-FFF2-40B4-BE49-F238E27FC236}">
-                <a16:creationId xmlns:a16="http://schemas.microsoft.com/office/drawing/2014/main" id="{1DD9B512-FCA7-E367-C61A-2D5809B148E6}"/>
+                <a16:creationId xmlns:a16="http://schemas.microsoft.com/office/drawing/2014/main" id="{89F8E6F4-CD09-B259-A2FD-49D608C52127}"/>
               </a:ext>
             </a:extLst>
           </p:cNvPr>
-          <p:cNvPicPr>
-            <a:picLocks noChangeAspect="1"/>
-          </p:cNvPicPr>
+          <p:cNvSpPr txBox="1"/>
           <p:nvPr/>
-        </p:nvPicPr>
-        <p:blipFill>
-          <a:blip r:embed="rId2">
-            <a:extLst>
-              <a:ext uri="{28A0092B-C50C-407E-A947-70E740481C1C}">
-                <a14:useLocalDpi xmlns:a14="http://schemas.microsoft.com/office/drawing/2010/main" val="0"/>
-              </a:ext>
-            </a:extLst>
-          </a:blip>
-          <a:srcRect l="76298" t="7576" r="3294" b="56417"/>
-          <a:stretch/>
-        </p:blipFill>
+        </p:nvSpPr>
         <p:spPr>
           <a:xfrm>
-            <a:off x="10293059" y="372047"/>
-            <a:ext cx="1586204" cy="2238849"/>
+            <a:off x="4718484" y="64270"/>
+            <a:ext cx="412292" cy="307777"/>
           </a:xfrm>
           <a:prstGeom prst="rect">
             <a:avLst/>
           </a:prstGeom>
+          <a:noFill/>
         </p:spPr>
-      </p:pic>
+        <p:txBody>
+          <a:bodyPr wrap="none" rtlCol="0">
+            <a:spAutoFit/>
+          </a:bodyPr>
+          <a:lstStyle/>
+          <a:p>
+            <a:r>
+              <a:rPr lang="en-US" sz="1400" dirty="0">
+                <a:latin typeface="Arial" panose="020B0604020202020204" pitchFamily="34" charset="0"/>
+                <a:cs typeface="Arial" panose="020B0604020202020204" pitchFamily="34" charset="0"/>
+              </a:rPr>
+              <a:t>(b)</a:t>
+            </a:r>
+          </a:p>
+        </p:txBody>
+      </p:sp>
     </p:spTree>
     <p:extLst>
       <p:ext uri="{BB962C8B-B14F-4D97-AF65-F5344CB8AC3E}">
-        <p14:creationId xmlns:p14="http://schemas.microsoft.com/office/powerpoint/2010/main" val="2951791587"/>
+        <p14:creationId xmlns:p14="http://schemas.microsoft.com/office/powerpoint/2010/main" val="1841374992"/>
       </p:ext>
     </p:extLst>
   </p:cSld>

</xml_diff>